<commit_message>
enable large MT and DU, re-test performance
</commit_message>
<xml_diff>
--- a/doc/mfma gemm.pptx
+++ b/doc/mfma gemm.pptx
@@ -5,10 +5,10 @@
     <p:sldMasterId id="2147483891" r:id="rId3"/>
   </p:sldMasterIdLst>
   <p:notesMasterIdLst>
-    <p:notesMasterId r:id="rId9"/>
+    <p:notesMasterId r:id="rId16"/>
   </p:notesMasterIdLst>
   <p:handoutMasterIdLst>
-    <p:handoutMasterId r:id="rId10"/>
+    <p:handoutMasterId r:id="rId17"/>
   </p:handoutMasterIdLst>
   <p:sldIdLst>
     <p:sldId id="2022" r:id="rId4"/>
@@ -16,6 +16,13 @@
     <p:sldId id="2024" r:id="rId6"/>
     <p:sldId id="2025" r:id="rId7"/>
     <p:sldId id="2026" r:id="rId8"/>
+    <p:sldId id="2027" r:id="rId9"/>
+    <p:sldId id="2028" r:id="rId10"/>
+    <p:sldId id="2029" r:id="rId11"/>
+    <p:sldId id="2033" r:id="rId12"/>
+    <p:sldId id="2030" r:id="rId13"/>
+    <p:sldId id="2031" r:id="rId14"/>
+    <p:sldId id="2032" r:id="rId15"/>
   </p:sldIdLst>
   <p:sldSz cx="12188825" cy="6858000"/>
   <p:notesSz cx="6858000" cy="4819650"/>
@@ -154,6 +161,13 @@
             <p14:sldId id="2024"/>
             <p14:sldId id="2025"/>
             <p14:sldId id="2026"/>
+            <p14:sldId id="2027"/>
+            <p14:sldId id="2028"/>
+            <p14:sldId id="2029"/>
+            <p14:sldId id="2033"/>
+            <p14:sldId id="2030"/>
+            <p14:sldId id="2031"/>
+            <p14:sldId id="2032"/>
           </p14:sldIdLst>
         </p14:section>
       </p14:sectionLst>
@@ -333,7 +347,7 @@
               <a:pPr>
                 <a:defRPr/>
               </a:pPr>
-              <a:t>3/13/2020</a:t>
+              <a:t>4/1/2020</a:t>
             </a:fld>
             <a:endParaRPr lang="en-US"/>
           </a:p>
@@ -552,7 +566,7 @@
               <a:pPr>
                 <a:defRPr/>
               </a:pPr>
-              <a:t>3/13/2020</a:t>
+              <a:t>4/1/2020</a:t>
             </a:fld>
             <a:endParaRPr lang="en-US"/>
           </a:p>
@@ -2780,6 +2794,465 @@
     <p:extLst>
       <p:ext uri="{BB962C8B-B14F-4D97-AF65-F5344CB8AC3E}">
         <p14:creationId xmlns:p14="http://schemas.microsoft.com/office/powerpoint/2010/main" val="350960616"/>
+      </p:ext>
+    </p:extLst>
+  </p:cSld>
+  <p:clrMapOvr>
+    <a:masterClrMapping/>
+  </p:clrMapOvr>
+</p:sld>
+</file>
+
+<file path=ppt/slides/slide10.xml><?xml version="1.0" encoding="utf-8"?>
+<p:sld xmlns:a="http://schemas.openxmlformats.org/drawingml/2006/main" xmlns:r="http://schemas.openxmlformats.org/officeDocument/2006/relationships" xmlns:p="http://schemas.openxmlformats.org/presentationml/2006/main">
+  <p:cSld>
+    <p:spTree>
+      <p:nvGrpSpPr>
+        <p:cNvPr id="1" name=""/>
+        <p:cNvGrpSpPr/>
+        <p:nvPr/>
+      </p:nvGrpSpPr>
+      <p:grpSpPr>
+        <a:xfrm>
+          <a:off x="0" y="0"/>
+          <a:ext cx="0" cy="0"/>
+          <a:chOff x="0" y="0"/>
+          <a:chExt cx="0" cy="0"/>
+        </a:xfrm>
+      </p:grpSpPr>
+      <p:sp>
+        <p:nvSpPr>
+          <p:cNvPr id="2" name="Content Placeholder 1">
+            <a:extLst>
+              <a:ext uri="{FF2B5EF4-FFF2-40B4-BE49-F238E27FC236}">
+                <a16:creationId xmlns:a16="http://schemas.microsoft.com/office/drawing/2014/main" id="{62F0C778-32F6-4750-AA9D-CF74A2AD5ADD}"/>
+              </a:ext>
+            </a:extLst>
+          </p:cNvPr>
+          <p:cNvSpPr>
+            <a:spLocks noGrp="1"/>
+          </p:cNvSpPr>
+          <p:nvPr>
+            <p:ph idx="1"/>
+          </p:nvPr>
+        </p:nvSpPr>
+        <p:spPr>
+          <a:xfrm>
+            <a:off x="313245" y="1038225"/>
+            <a:ext cx="11338560" cy="5067302"/>
+          </a:xfrm>
+        </p:spPr>
+        <p:txBody>
+          <a:bodyPr/>
+          <a:lstStyle/>
+          <a:p>
+            <a:r>
+              <a:rPr lang="en-US" altLang="zh-CN" dirty="0"/>
+              <a:t>Performance – Phantom fp32:</a:t>
+            </a:r>
+          </a:p>
+        </p:txBody>
+      </p:sp>
+      <p:sp>
+        <p:nvSpPr>
+          <p:cNvPr id="3" name="Title 2">
+            <a:extLst>
+              <a:ext uri="{FF2B5EF4-FFF2-40B4-BE49-F238E27FC236}">
+                <a16:creationId xmlns:a16="http://schemas.microsoft.com/office/drawing/2014/main" id="{CEDC0840-5118-4BFD-899F-D50C1A686498}"/>
+              </a:ext>
+            </a:extLst>
+          </p:cNvPr>
+          <p:cNvSpPr>
+            <a:spLocks noGrp="1"/>
+          </p:cNvSpPr>
+          <p:nvPr>
+            <p:ph type="title"/>
+          </p:nvPr>
+        </p:nvSpPr>
+        <p:spPr/>
+        <p:txBody>
+          <a:bodyPr/>
+          <a:lstStyle/>
+          <a:p>
+            <a:r>
+              <a:rPr lang="en-US" altLang="zh-CN" dirty="0"/>
+              <a:t>Auto generator </a:t>
+            </a:r>
+            <a:endParaRPr lang="en-US" dirty="0"/>
+          </a:p>
+        </p:txBody>
+      </p:sp>
+      <p:sp>
+        <p:nvSpPr>
+          <p:cNvPr id="4" name="Text Placeholder 3">
+            <a:extLst>
+              <a:ext uri="{FF2B5EF4-FFF2-40B4-BE49-F238E27FC236}">
+                <a16:creationId xmlns:a16="http://schemas.microsoft.com/office/drawing/2014/main" id="{23BC3E91-3C7D-4DD3-9DC0-25A44DC2381D}"/>
+              </a:ext>
+            </a:extLst>
+          </p:cNvPr>
+          <p:cNvSpPr>
+            <a:spLocks noGrp="1"/>
+          </p:cNvSpPr>
+          <p:nvPr>
+            <p:ph type="body" sz="quarter" idx="10"/>
+          </p:nvPr>
+        </p:nvSpPr>
+        <p:spPr/>
+        <p:txBody>
+          <a:bodyPr/>
+          <a:lstStyle/>
+          <a:p>
+            <a:endParaRPr lang="en-US" dirty="0"/>
+          </a:p>
+        </p:txBody>
+      </p:sp>
+      <p:pic>
+        <p:nvPicPr>
+          <p:cNvPr id="8" name="Picture 7" descr="A screenshot of a cell phone&#10;&#10;Description automatically generated">
+            <a:extLst>
+              <a:ext uri="{FF2B5EF4-FFF2-40B4-BE49-F238E27FC236}">
+                <a16:creationId xmlns:a16="http://schemas.microsoft.com/office/drawing/2014/main" id="{5CE09579-23B9-4003-B7E2-D3360972D2C0}"/>
+              </a:ext>
+            </a:extLst>
+          </p:cNvPr>
+          <p:cNvPicPr>
+            <a:picLocks noChangeAspect="1"/>
+          </p:cNvPicPr>
+          <p:nvPr/>
+        </p:nvPicPr>
+        <p:blipFill>
+          <a:blip r:embed="rId2">
+            <a:extLst>
+              <a:ext uri="{28A0092B-C50C-407E-A947-70E740481C1C}">
+                <a14:useLocalDpi xmlns:a14="http://schemas.microsoft.com/office/drawing/2010/main" val="0"/>
+              </a:ext>
+            </a:extLst>
+          </a:blip>
+          <a:stretch>
+            <a:fillRect/>
+          </a:stretch>
+        </p:blipFill>
+        <p:spPr>
+          <a:xfrm>
+            <a:off x="1685915" y="1537967"/>
+            <a:ext cx="8359796" cy="4964433"/>
+          </a:xfrm>
+          <a:prstGeom prst="rect">
+            <a:avLst/>
+          </a:prstGeom>
+        </p:spPr>
+      </p:pic>
+    </p:spTree>
+    <p:extLst>
+      <p:ext uri="{BB962C8B-B14F-4D97-AF65-F5344CB8AC3E}">
+        <p14:creationId xmlns:p14="http://schemas.microsoft.com/office/powerpoint/2010/main" val="697874042"/>
+      </p:ext>
+    </p:extLst>
+  </p:cSld>
+  <p:clrMapOvr>
+    <a:masterClrMapping/>
+  </p:clrMapOvr>
+</p:sld>
+</file>
+
+<file path=ppt/slides/slide11.xml><?xml version="1.0" encoding="utf-8"?>
+<p:sld xmlns:a="http://schemas.openxmlformats.org/drawingml/2006/main" xmlns:r="http://schemas.openxmlformats.org/officeDocument/2006/relationships" xmlns:p="http://schemas.openxmlformats.org/presentationml/2006/main">
+  <p:cSld>
+    <p:spTree>
+      <p:nvGrpSpPr>
+        <p:cNvPr id="1" name=""/>
+        <p:cNvGrpSpPr/>
+        <p:nvPr/>
+      </p:nvGrpSpPr>
+      <p:grpSpPr>
+        <a:xfrm>
+          <a:off x="0" y="0"/>
+          <a:ext cx="0" cy="0"/>
+          <a:chOff x="0" y="0"/>
+          <a:chExt cx="0" cy="0"/>
+        </a:xfrm>
+      </p:grpSpPr>
+      <p:sp>
+        <p:nvSpPr>
+          <p:cNvPr id="2" name="Content Placeholder 1">
+            <a:extLst>
+              <a:ext uri="{FF2B5EF4-FFF2-40B4-BE49-F238E27FC236}">
+                <a16:creationId xmlns:a16="http://schemas.microsoft.com/office/drawing/2014/main" id="{62F0C778-32F6-4750-AA9D-CF74A2AD5ADD}"/>
+              </a:ext>
+            </a:extLst>
+          </p:cNvPr>
+          <p:cNvSpPr>
+            <a:spLocks noGrp="1"/>
+          </p:cNvSpPr>
+          <p:nvPr>
+            <p:ph idx="1"/>
+          </p:nvPr>
+        </p:nvSpPr>
+        <p:spPr>
+          <a:xfrm>
+            <a:off x="313245" y="1038225"/>
+            <a:ext cx="11338560" cy="5067302"/>
+          </a:xfrm>
+        </p:spPr>
+        <p:txBody>
+          <a:bodyPr/>
+          <a:lstStyle/>
+          <a:p>
+            <a:r>
+              <a:rPr lang="en-US" altLang="zh-CN" dirty="0"/>
+              <a:t>Performance – Phantom bf16:</a:t>
+            </a:r>
+          </a:p>
+        </p:txBody>
+      </p:sp>
+      <p:sp>
+        <p:nvSpPr>
+          <p:cNvPr id="3" name="Title 2">
+            <a:extLst>
+              <a:ext uri="{FF2B5EF4-FFF2-40B4-BE49-F238E27FC236}">
+                <a16:creationId xmlns:a16="http://schemas.microsoft.com/office/drawing/2014/main" id="{CEDC0840-5118-4BFD-899F-D50C1A686498}"/>
+              </a:ext>
+            </a:extLst>
+          </p:cNvPr>
+          <p:cNvSpPr>
+            <a:spLocks noGrp="1"/>
+          </p:cNvSpPr>
+          <p:nvPr>
+            <p:ph type="title"/>
+          </p:nvPr>
+        </p:nvSpPr>
+        <p:spPr/>
+        <p:txBody>
+          <a:bodyPr/>
+          <a:lstStyle/>
+          <a:p>
+            <a:r>
+              <a:rPr lang="en-US" altLang="zh-CN" dirty="0"/>
+              <a:t>Auto generator </a:t>
+            </a:r>
+            <a:endParaRPr lang="en-US" dirty="0"/>
+          </a:p>
+        </p:txBody>
+      </p:sp>
+      <p:sp>
+        <p:nvSpPr>
+          <p:cNvPr id="4" name="Text Placeholder 3">
+            <a:extLst>
+              <a:ext uri="{FF2B5EF4-FFF2-40B4-BE49-F238E27FC236}">
+                <a16:creationId xmlns:a16="http://schemas.microsoft.com/office/drawing/2014/main" id="{23BC3E91-3C7D-4DD3-9DC0-25A44DC2381D}"/>
+              </a:ext>
+            </a:extLst>
+          </p:cNvPr>
+          <p:cNvSpPr>
+            <a:spLocks noGrp="1"/>
+          </p:cNvSpPr>
+          <p:nvPr>
+            <p:ph type="body" sz="quarter" idx="10"/>
+          </p:nvPr>
+        </p:nvSpPr>
+        <p:spPr/>
+        <p:txBody>
+          <a:bodyPr/>
+          <a:lstStyle/>
+          <a:p>
+            <a:endParaRPr lang="en-US" dirty="0"/>
+          </a:p>
+        </p:txBody>
+      </p:sp>
+      <p:pic>
+        <p:nvPicPr>
+          <p:cNvPr id="6" name="Picture 5" descr="A screenshot of a cell phone&#10;&#10;Description automatically generated">
+            <a:extLst>
+              <a:ext uri="{FF2B5EF4-FFF2-40B4-BE49-F238E27FC236}">
+                <a16:creationId xmlns:a16="http://schemas.microsoft.com/office/drawing/2014/main" id="{E8B34306-5882-4056-A4E2-A8E5CE744714}"/>
+              </a:ext>
+            </a:extLst>
+          </p:cNvPr>
+          <p:cNvPicPr>
+            <a:picLocks noChangeAspect="1"/>
+          </p:cNvPicPr>
+          <p:nvPr/>
+        </p:nvPicPr>
+        <p:blipFill>
+          <a:blip r:embed="rId2">
+            <a:extLst>
+              <a:ext uri="{28A0092B-C50C-407E-A947-70E740481C1C}">
+                <a14:useLocalDpi xmlns:a14="http://schemas.microsoft.com/office/drawing/2010/main" val="0"/>
+              </a:ext>
+            </a:extLst>
+          </a:blip>
+          <a:stretch>
+            <a:fillRect/>
+          </a:stretch>
+        </p:blipFill>
+        <p:spPr>
+          <a:xfrm>
+            <a:off x="1726140" y="1581545"/>
+            <a:ext cx="8279345" cy="4903921"/>
+          </a:xfrm>
+          <a:prstGeom prst="rect">
+            <a:avLst/>
+          </a:prstGeom>
+        </p:spPr>
+      </p:pic>
+    </p:spTree>
+    <p:extLst>
+      <p:ext uri="{BB962C8B-B14F-4D97-AF65-F5344CB8AC3E}">
+        <p14:creationId xmlns:p14="http://schemas.microsoft.com/office/powerpoint/2010/main" val="3185651181"/>
+      </p:ext>
+    </p:extLst>
+  </p:cSld>
+  <p:clrMapOvr>
+    <a:masterClrMapping/>
+  </p:clrMapOvr>
+</p:sld>
+</file>
+
+<file path=ppt/slides/slide12.xml><?xml version="1.0" encoding="utf-8"?>
+<p:sld xmlns:a="http://schemas.openxmlformats.org/drawingml/2006/main" xmlns:r="http://schemas.openxmlformats.org/officeDocument/2006/relationships" xmlns:p="http://schemas.openxmlformats.org/presentationml/2006/main">
+  <p:cSld>
+    <p:spTree>
+      <p:nvGrpSpPr>
+        <p:cNvPr id="1" name=""/>
+        <p:cNvGrpSpPr/>
+        <p:nvPr/>
+      </p:nvGrpSpPr>
+      <p:grpSpPr>
+        <a:xfrm>
+          <a:off x="0" y="0"/>
+          <a:ext cx="0" cy="0"/>
+          <a:chOff x="0" y="0"/>
+          <a:chExt cx="0" cy="0"/>
+        </a:xfrm>
+      </p:grpSpPr>
+      <p:sp>
+        <p:nvSpPr>
+          <p:cNvPr id="2" name="Content Placeholder 1">
+            <a:extLst>
+              <a:ext uri="{FF2B5EF4-FFF2-40B4-BE49-F238E27FC236}">
+                <a16:creationId xmlns:a16="http://schemas.microsoft.com/office/drawing/2014/main" id="{62F0C778-32F6-4750-AA9D-CF74A2AD5ADD}"/>
+              </a:ext>
+            </a:extLst>
+          </p:cNvPr>
+          <p:cNvSpPr>
+            <a:spLocks noGrp="1"/>
+          </p:cNvSpPr>
+          <p:nvPr>
+            <p:ph idx="1"/>
+          </p:nvPr>
+        </p:nvSpPr>
+        <p:spPr>
+          <a:xfrm>
+            <a:off x="313245" y="1038225"/>
+            <a:ext cx="11338560" cy="5067302"/>
+          </a:xfrm>
+        </p:spPr>
+        <p:txBody>
+          <a:bodyPr/>
+          <a:lstStyle/>
+          <a:p>
+            <a:r>
+              <a:rPr lang="en-US" altLang="zh-CN" dirty="0"/>
+              <a:t>Performance – Phantom fp16:</a:t>
+            </a:r>
+          </a:p>
+        </p:txBody>
+      </p:sp>
+      <p:sp>
+        <p:nvSpPr>
+          <p:cNvPr id="3" name="Title 2">
+            <a:extLst>
+              <a:ext uri="{FF2B5EF4-FFF2-40B4-BE49-F238E27FC236}">
+                <a16:creationId xmlns:a16="http://schemas.microsoft.com/office/drawing/2014/main" id="{CEDC0840-5118-4BFD-899F-D50C1A686498}"/>
+              </a:ext>
+            </a:extLst>
+          </p:cNvPr>
+          <p:cNvSpPr>
+            <a:spLocks noGrp="1"/>
+          </p:cNvSpPr>
+          <p:nvPr>
+            <p:ph type="title"/>
+          </p:nvPr>
+        </p:nvSpPr>
+        <p:spPr/>
+        <p:txBody>
+          <a:bodyPr/>
+          <a:lstStyle/>
+          <a:p>
+            <a:r>
+              <a:rPr lang="en-US" altLang="zh-CN" dirty="0"/>
+              <a:t>Auto generator </a:t>
+            </a:r>
+            <a:endParaRPr lang="en-US" dirty="0"/>
+          </a:p>
+        </p:txBody>
+      </p:sp>
+      <p:sp>
+        <p:nvSpPr>
+          <p:cNvPr id="4" name="Text Placeholder 3">
+            <a:extLst>
+              <a:ext uri="{FF2B5EF4-FFF2-40B4-BE49-F238E27FC236}">
+                <a16:creationId xmlns:a16="http://schemas.microsoft.com/office/drawing/2014/main" id="{23BC3E91-3C7D-4DD3-9DC0-25A44DC2381D}"/>
+              </a:ext>
+            </a:extLst>
+          </p:cNvPr>
+          <p:cNvSpPr>
+            <a:spLocks noGrp="1"/>
+          </p:cNvSpPr>
+          <p:nvPr>
+            <p:ph type="body" sz="quarter" idx="10"/>
+          </p:nvPr>
+        </p:nvSpPr>
+        <p:spPr/>
+        <p:txBody>
+          <a:bodyPr/>
+          <a:lstStyle/>
+          <a:p>
+            <a:endParaRPr lang="en-US" dirty="0"/>
+          </a:p>
+        </p:txBody>
+      </p:sp>
+      <p:pic>
+        <p:nvPicPr>
+          <p:cNvPr id="7" name="Picture 6" descr="A screenshot of a cell phone&#10;&#10;Description automatically generated">
+            <a:extLst>
+              <a:ext uri="{FF2B5EF4-FFF2-40B4-BE49-F238E27FC236}">
+                <a16:creationId xmlns:a16="http://schemas.microsoft.com/office/drawing/2014/main" id="{054F8F7F-8E6B-4035-A1F2-1ABED429DF6E}"/>
+              </a:ext>
+            </a:extLst>
+          </p:cNvPr>
+          <p:cNvPicPr>
+            <a:picLocks noChangeAspect="1"/>
+          </p:cNvPicPr>
+          <p:nvPr/>
+        </p:nvPicPr>
+        <p:blipFill>
+          <a:blip r:embed="rId2">
+            <a:extLst>
+              <a:ext uri="{28A0092B-C50C-407E-A947-70E740481C1C}">
+                <a14:useLocalDpi xmlns:a14="http://schemas.microsoft.com/office/drawing/2010/main" val="0"/>
+              </a:ext>
+            </a:extLst>
+          </a:blip>
+          <a:stretch>
+            <a:fillRect/>
+          </a:stretch>
+        </p:blipFill>
+        <p:spPr>
+          <a:xfrm>
+            <a:off x="1657821" y="1532467"/>
+            <a:ext cx="8415984" cy="4969933"/>
+          </a:xfrm>
+          <a:prstGeom prst="rect">
+            <a:avLst/>
+          </a:prstGeom>
+        </p:spPr>
+      </p:pic>
+    </p:spTree>
+    <p:extLst>
+      <p:ext uri="{BB962C8B-B14F-4D97-AF65-F5344CB8AC3E}">
+        <p14:creationId xmlns:p14="http://schemas.microsoft.com/office/powerpoint/2010/main" val="2781934661"/>
       </p:ext>
     </p:extLst>
   </p:cSld>
@@ -4187,164 +4660,993 @@
             </p:style>
           </p:cxnSp>
         </p:grpSp>
-        <p:grpSp>
-          <p:nvGrpSpPr>
-            <p:cNvPr id="33" name="Group 32">
+        <p:cxnSp>
+          <p:nvCxnSpPr>
+            <p:cNvPr id="31" name="Straight Connector 30">
               <a:extLst>
                 <a:ext uri="{FF2B5EF4-FFF2-40B4-BE49-F238E27FC236}">
-                  <a16:creationId xmlns:a16="http://schemas.microsoft.com/office/drawing/2014/main" id="{00E80622-D97B-41A7-877E-731E55BEC7AD}"/>
+                  <a16:creationId xmlns:a16="http://schemas.microsoft.com/office/drawing/2014/main" id="{ADE98E5A-49BC-4EAF-8452-6CE23726E484}"/>
                 </a:ext>
               </a:extLst>
             </p:cNvPr>
-            <p:cNvGrpSpPr/>
+            <p:cNvCxnSpPr>
+              <a:cxnSpLocks/>
+            </p:cNvCxnSpPr>
             <p:nvPr/>
-          </p:nvGrpSpPr>
-          <p:grpSpPr>
+          </p:nvCxnSpPr>
+          <p:spPr>
             <a:xfrm>
-              <a:off x="2327715" y="2879329"/>
-              <a:ext cx="1152085" cy="768747"/>
-              <a:chOff x="2327715" y="2879329"/>
-              <a:chExt cx="1152085" cy="768747"/>
+              <a:off x="2327715" y="3648076"/>
+              <a:ext cx="931952" cy="0"/>
             </a:xfrm>
-          </p:grpSpPr>
-          <p:cxnSp>
-            <p:nvCxnSpPr>
-              <p:cNvPr id="27" name="Connector: Curved 26">
-                <a:extLst>
-                  <a:ext uri="{FF2B5EF4-FFF2-40B4-BE49-F238E27FC236}">
-                    <a16:creationId xmlns:a16="http://schemas.microsoft.com/office/drawing/2014/main" id="{76017FD3-F061-4B43-B8D3-0FFC7B5DDF74}"/>
-                  </a:ext>
-                </a:extLst>
-              </p:cNvPr>
-              <p:cNvCxnSpPr>
-                <a:cxnSpLocks/>
-              </p:cNvCxnSpPr>
-              <p:nvPr/>
-            </p:nvCxnSpPr>
-            <p:spPr>
-              <a:xfrm>
-                <a:off x="2641600" y="2879329"/>
-                <a:ext cx="838200" cy="12700"/>
-              </a:xfrm>
-              <a:prstGeom prst="curvedConnector3">
-                <a:avLst/>
-              </a:prstGeom>
-              <a:ln w="19050">
-                <a:solidFill>
-                  <a:srgbClr val="FF0000"/>
-                </a:solidFill>
-                <a:tailEnd type="triangle"/>
-              </a:ln>
-            </p:spPr>
-            <p:style>
-              <a:lnRef idx="1">
+            <a:prstGeom prst="line">
+              <a:avLst/>
+            </a:prstGeom>
+            <a:ln w="28575">
+              <a:solidFill>
                 <a:schemeClr val="accent1"/>
-              </a:lnRef>
-              <a:fillRef idx="0">
-                <a:schemeClr val="accent1"/>
-              </a:fillRef>
-              <a:effectRef idx="0">
-                <a:schemeClr val="accent1"/>
-              </a:effectRef>
-              <a:fontRef idx="minor">
-                <a:schemeClr val="tx1"/>
-              </a:fontRef>
-            </p:style>
-          </p:cxnSp>
-          <p:cxnSp>
-            <p:nvCxnSpPr>
-              <p:cNvPr id="29" name="Connector: Curved 28">
-                <a:extLst>
-                  <a:ext uri="{FF2B5EF4-FFF2-40B4-BE49-F238E27FC236}">
-                    <a16:creationId xmlns:a16="http://schemas.microsoft.com/office/drawing/2014/main" id="{EE4C8E5D-4869-4CD9-AA59-75F47EE08D57}"/>
-                  </a:ext>
-                </a:extLst>
-              </p:cNvPr>
-              <p:cNvCxnSpPr>
-                <a:cxnSpLocks/>
-              </p:cNvCxnSpPr>
-              <p:nvPr/>
-            </p:nvCxnSpPr>
-            <p:spPr>
-              <a:xfrm>
-                <a:off x="2674848" y="3269059"/>
-                <a:ext cx="804952" cy="12700"/>
-              </a:xfrm>
-              <a:prstGeom prst="curvedConnector3">
-                <a:avLst/>
-              </a:prstGeom>
-              <a:ln w="19050">
-                <a:solidFill>
-                  <a:srgbClr val="7030A0"/>
-                </a:solidFill>
-                <a:tailEnd type="triangle"/>
-              </a:ln>
-            </p:spPr>
-            <p:style>
-              <a:lnRef idx="1">
-                <a:schemeClr val="accent1"/>
-              </a:lnRef>
-              <a:fillRef idx="0">
-                <a:schemeClr val="accent1"/>
-              </a:fillRef>
-              <a:effectRef idx="0">
-                <a:schemeClr val="accent1"/>
-              </a:effectRef>
-              <a:fontRef idx="minor">
-                <a:schemeClr val="tx1"/>
-              </a:fontRef>
-            </p:style>
-          </p:cxnSp>
-          <p:cxnSp>
-            <p:nvCxnSpPr>
-              <p:cNvPr id="31" name="Straight Connector 30">
-                <a:extLst>
-                  <a:ext uri="{FF2B5EF4-FFF2-40B4-BE49-F238E27FC236}">
-                    <a16:creationId xmlns:a16="http://schemas.microsoft.com/office/drawing/2014/main" id="{ADE98E5A-49BC-4EAF-8452-6CE23726E484}"/>
-                  </a:ext>
-                </a:extLst>
-              </p:cNvPr>
-              <p:cNvCxnSpPr>
-                <a:cxnSpLocks/>
-              </p:cNvCxnSpPr>
-              <p:nvPr/>
-            </p:nvCxnSpPr>
-            <p:spPr>
-              <a:xfrm>
-                <a:off x="2327715" y="3648076"/>
-                <a:ext cx="931952" cy="0"/>
-              </a:xfrm>
-              <a:prstGeom prst="line">
-                <a:avLst/>
-              </a:prstGeom>
-              <a:ln w="28575">
-                <a:solidFill>
-                  <a:schemeClr val="accent1"/>
-                </a:solidFill>
-                <a:prstDash val="sysDash"/>
-              </a:ln>
-            </p:spPr>
-            <p:style>
-              <a:lnRef idx="1">
-                <a:schemeClr val="accent1"/>
-              </a:lnRef>
-              <a:fillRef idx="0">
-                <a:schemeClr val="accent1"/>
-              </a:fillRef>
-              <a:effectRef idx="0">
-                <a:schemeClr val="accent1"/>
-              </a:effectRef>
-              <a:fontRef idx="minor">
-                <a:schemeClr val="tx1"/>
-              </a:fontRef>
-            </p:style>
-          </p:cxnSp>
-        </p:grpSp>
+              </a:solidFill>
+              <a:prstDash val="sysDash"/>
+            </a:ln>
+          </p:spPr>
+          <p:style>
+            <a:lnRef idx="1">
+              <a:schemeClr val="accent1"/>
+            </a:lnRef>
+            <a:fillRef idx="0">
+              <a:schemeClr val="accent1"/>
+            </a:fillRef>
+            <a:effectRef idx="0">
+              <a:schemeClr val="accent1"/>
+            </a:effectRef>
+            <a:fontRef idx="minor">
+              <a:schemeClr val="tx1"/>
+            </a:fontRef>
+          </p:style>
+        </p:cxnSp>
       </p:grpSp>
+      <p:cxnSp>
+        <p:nvCxnSpPr>
+          <p:cNvPr id="7" name="Straight Arrow Connector 6">
+            <a:extLst>
+              <a:ext uri="{FF2B5EF4-FFF2-40B4-BE49-F238E27FC236}">
+                <a16:creationId xmlns:a16="http://schemas.microsoft.com/office/drawing/2014/main" id="{0D4EED08-B79D-4019-B141-ACE5ADBB47E7}"/>
+              </a:ext>
+            </a:extLst>
+          </p:cNvPr>
+          <p:cNvCxnSpPr/>
+          <p:nvPr/>
+        </p:nvCxnSpPr>
+        <p:spPr>
+          <a:xfrm>
+            <a:off x="2643188" y="2882900"/>
+            <a:ext cx="819150" cy="0"/>
+          </a:xfrm>
+          <a:prstGeom prst="straightConnector1">
+            <a:avLst/>
+          </a:prstGeom>
+          <a:ln w="19050">
+            <a:solidFill>
+              <a:srgbClr val="ED1C24"/>
+            </a:solidFill>
+            <a:tailEnd type="triangle"/>
+          </a:ln>
+        </p:spPr>
+        <p:style>
+          <a:lnRef idx="1">
+            <a:schemeClr val="accent1"/>
+          </a:lnRef>
+          <a:fillRef idx="0">
+            <a:schemeClr val="accent1"/>
+          </a:fillRef>
+          <a:effectRef idx="0">
+            <a:schemeClr val="accent1"/>
+          </a:effectRef>
+          <a:fontRef idx="minor">
+            <a:schemeClr val="tx1"/>
+          </a:fontRef>
+        </p:style>
+      </p:cxnSp>
+      <p:cxnSp>
+        <p:nvCxnSpPr>
+          <p:cNvPr id="28" name="Straight Arrow Connector 27">
+            <a:extLst>
+              <a:ext uri="{FF2B5EF4-FFF2-40B4-BE49-F238E27FC236}">
+                <a16:creationId xmlns:a16="http://schemas.microsoft.com/office/drawing/2014/main" id="{3642B3E5-FB19-4192-A0F9-CAE0551445DC}"/>
+              </a:ext>
+            </a:extLst>
+          </p:cNvPr>
+          <p:cNvCxnSpPr/>
+          <p:nvPr/>
+        </p:nvCxnSpPr>
+        <p:spPr>
+          <a:xfrm>
+            <a:off x="2643188" y="3265884"/>
+            <a:ext cx="819150" cy="0"/>
+          </a:xfrm>
+          <a:prstGeom prst="straightConnector1">
+            <a:avLst/>
+          </a:prstGeom>
+          <a:ln w="19050">
+            <a:solidFill>
+              <a:srgbClr val="7030A0"/>
+            </a:solidFill>
+            <a:tailEnd type="triangle"/>
+          </a:ln>
+        </p:spPr>
+        <p:style>
+          <a:lnRef idx="1">
+            <a:schemeClr val="accent1"/>
+          </a:lnRef>
+          <a:fillRef idx="0">
+            <a:schemeClr val="accent1"/>
+          </a:fillRef>
+          <a:effectRef idx="0">
+            <a:schemeClr val="accent1"/>
+          </a:effectRef>
+          <a:fontRef idx="minor">
+            <a:schemeClr val="tx1"/>
+          </a:fontRef>
+        </p:style>
+      </p:cxnSp>
     </p:spTree>
     <p:extLst>
       <p:ext uri="{BB962C8B-B14F-4D97-AF65-F5344CB8AC3E}">
         <p14:creationId xmlns:p14="http://schemas.microsoft.com/office/powerpoint/2010/main" val="2615999024"/>
+      </p:ext>
+    </p:extLst>
+  </p:cSld>
+  <p:clrMapOvr>
+    <a:masterClrMapping/>
+  </p:clrMapOvr>
+</p:sld>
+</file>
+
+<file path=ppt/slides/slide6.xml><?xml version="1.0" encoding="utf-8"?>
+<p:sld xmlns:a="http://schemas.openxmlformats.org/drawingml/2006/main" xmlns:r="http://schemas.openxmlformats.org/officeDocument/2006/relationships" xmlns:p="http://schemas.openxmlformats.org/presentationml/2006/main">
+  <p:cSld>
+    <p:spTree>
+      <p:nvGrpSpPr>
+        <p:cNvPr id="1" name=""/>
+        <p:cNvGrpSpPr/>
+        <p:nvPr/>
+      </p:nvGrpSpPr>
+      <p:grpSpPr>
+        <a:xfrm>
+          <a:off x="0" y="0"/>
+          <a:ext cx="0" cy="0"/>
+          <a:chOff x="0" y="0"/>
+          <a:chExt cx="0" cy="0"/>
+        </a:xfrm>
+      </p:grpSpPr>
+      <p:sp>
+        <p:nvSpPr>
+          <p:cNvPr id="2" name="Content Placeholder 1">
+            <a:extLst>
+              <a:ext uri="{FF2B5EF4-FFF2-40B4-BE49-F238E27FC236}">
+                <a16:creationId xmlns:a16="http://schemas.microsoft.com/office/drawing/2014/main" id="{62F0C778-32F6-4750-AA9D-CF74A2AD5ADD}"/>
+              </a:ext>
+            </a:extLst>
+          </p:cNvPr>
+          <p:cNvSpPr>
+            <a:spLocks noGrp="1"/>
+          </p:cNvSpPr>
+          <p:nvPr>
+            <p:ph idx="1"/>
+          </p:nvPr>
+        </p:nvSpPr>
+        <p:spPr>
+          <a:xfrm>
+            <a:off x="313245" y="1038225"/>
+            <a:ext cx="11338560" cy="5067302"/>
+          </a:xfrm>
+        </p:spPr>
+        <p:txBody>
+          <a:bodyPr/>
+          <a:lstStyle/>
+          <a:p>
+            <a:r>
+              <a:rPr lang="en-US" altLang="zh-CN" dirty="0"/>
+              <a:t>Global store work load:</a:t>
+            </a:r>
+          </a:p>
+          <a:p>
+            <a:pPr lvl="1"/>
+            <a:r>
+              <a:rPr lang="en-US" dirty="0"/>
+              <a:t>store instruction width: </a:t>
+            </a:r>
+          </a:p>
+          <a:p>
+            <a:pPr lvl="2"/>
+            <a:r>
+              <a:rPr lang="en-US" dirty="0"/>
+              <a:t>1DWORD = 2 element</a:t>
+            </a:r>
+          </a:p>
+          <a:p>
+            <a:pPr lvl="1"/>
+            <a:r>
+              <a:rPr lang="en-US" altLang="zh-CN" dirty="0"/>
+              <a:t>store amount:</a:t>
+            </a:r>
+          </a:p>
+          <a:p>
+            <a:pPr lvl="2"/>
+            <a:r>
+              <a:rPr lang="en-US" altLang="zh-CN" dirty="0"/>
+              <a:t> </a:t>
+            </a:r>
+            <a:r>
+              <a:rPr lang="en-US" altLang="zh-CN" dirty="0" err="1"/>
+              <a:t>mfma_tile</a:t>
+            </a:r>
+            <a:r>
+              <a:rPr lang="en-US" altLang="zh-CN" dirty="0"/>
+              <a:t> * </a:t>
+            </a:r>
+            <a:r>
+              <a:rPr lang="en-US" altLang="zh-CN" dirty="0" err="1"/>
+              <a:t>mfma_tile</a:t>
+            </a:r>
+            <a:r>
+              <a:rPr lang="en-US" altLang="zh-CN" dirty="0"/>
+              <a:t> * round</a:t>
+            </a:r>
+          </a:p>
+          <a:p>
+            <a:pPr marL="1188720" lvl="3" indent="0">
+              <a:buNone/>
+            </a:pPr>
+            <a:r>
+              <a:rPr lang="en-US" altLang="zh-CN" dirty="0"/>
+              <a:t> = 4 * 4 * 2 = 32 elements / thread</a:t>
+            </a:r>
+          </a:p>
+          <a:p>
+            <a:pPr lvl="1"/>
+            <a:r>
+              <a:rPr lang="en-US" altLang="zh-CN" dirty="0"/>
+              <a:t>Store round:</a:t>
+            </a:r>
+          </a:p>
+          <a:p>
+            <a:pPr lvl="2"/>
+            <a:r>
+              <a:rPr lang="en-US" dirty="0" err="1"/>
+              <a:t>mfma</a:t>
+            </a:r>
+            <a:r>
+              <a:rPr lang="en-US" dirty="0"/>
+              <a:t> per wave = 2 round</a:t>
+            </a:r>
+            <a:endParaRPr lang="en-US" altLang="zh-CN" dirty="0"/>
+          </a:p>
+        </p:txBody>
+      </p:sp>
+      <p:sp>
+        <p:nvSpPr>
+          <p:cNvPr id="3" name="Title 2">
+            <a:extLst>
+              <a:ext uri="{FF2B5EF4-FFF2-40B4-BE49-F238E27FC236}">
+                <a16:creationId xmlns:a16="http://schemas.microsoft.com/office/drawing/2014/main" id="{CEDC0840-5118-4BFD-899F-D50C1A686498}"/>
+              </a:ext>
+            </a:extLst>
+          </p:cNvPr>
+          <p:cNvSpPr>
+            <a:spLocks noGrp="1"/>
+          </p:cNvSpPr>
+          <p:nvPr>
+            <p:ph type="title"/>
+          </p:nvPr>
+        </p:nvSpPr>
+        <p:spPr/>
+        <p:txBody>
+          <a:bodyPr/>
+          <a:lstStyle/>
+          <a:p>
+            <a:r>
+              <a:rPr lang="en-US" altLang="zh-CN" dirty="0"/>
+              <a:t>Auto generator </a:t>
+            </a:r>
+            <a:endParaRPr lang="en-US" dirty="0"/>
+          </a:p>
+        </p:txBody>
+      </p:sp>
+      <p:sp>
+        <p:nvSpPr>
+          <p:cNvPr id="4" name="Text Placeholder 3">
+            <a:extLst>
+              <a:ext uri="{FF2B5EF4-FFF2-40B4-BE49-F238E27FC236}">
+                <a16:creationId xmlns:a16="http://schemas.microsoft.com/office/drawing/2014/main" id="{23BC3E91-3C7D-4DD3-9DC0-25A44DC2381D}"/>
+              </a:ext>
+            </a:extLst>
+          </p:cNvPr>
+          <p:cNvSpPr>
+            <a:spLocks noGrp="1"/>
+          </p:cNvSpPr>
+          <p:nvPr>
+            <p:ph type="body" sz="quarter" idx="10"/>
+          </p:nvPr>
+        </p:nvSpPr>
+        <p:spPr/>
+        <p:txBody>
+          <a:bodyPr/>
+          <a:lstStyle/>
+          <a:p>
+            <a:endParaRPr lang="en-US" dirty="0"/>
+          </a:p>
+        </p:txBody>
+      </p:sp>
+      <p:pic>
+        <p:nvPicPr>
+          <p:cNvPr id="12" name="Picture 11" descr="A screen shot of a cage&#10;&#10;Description automatically generated">
+            <a:extLst>
+              <a:ext uri="{FF2B5EF4-FFF2-40B4-BE49-F238E27FC236}">
+                <a16:creationId xmlns:a16="http://schemas.microsoft.com/office/drawing/2014/main" id="{FEA4C8EF-1210-453E-ADC2-05179909808D}"/>
+              </a:ext>
+            </a:extLst>
+          </p:cNvPr>
+          <p:cNvPicPr>
+            <a:picLocks noChangeAspect="1"/>
+          </p:cNvPicPr>
+          <p:nvPr/>
+        </p:nvPicPr>
+        <p:blipFill>
+          <a:blip r:embed="rId2">
+            <a:extLst>
+              <a:ext uri="{28A0092B-C50C-407E-A947-70E740481C1C}">
+                <a14:useLocalDpi xmlns:a14="http://schemas.microsoft.com/office/drawing/2010/main" val="0"/>
+              </a:ext>
+            </a:extLst>
+          </a:blip>
+          <a:stretch>
+            <a:fillRect/>
+          </a:stretch>
+        </p:blipFill>
+        <p:spPr>
+          <a:xfrm>
+            <a:off x="5664201" y="917297"/>
+            <a:ext cx="6211428" cy="5662573"/>
+          </a:xfrm>
+          <a:prstGeom prst="rect">
+            <a:avLst/>
+          </a:prstGeom>
+        </p:spPr>
+      </p:pic>
+    </p:spTree>
+    <p:extLst>
+      <p:ext uri="{BB962C8B-B14F-4D97-AF65-F5344CB8AC3E}">
+        <p14:creationId xmlns:p14="http://schemas.microsoft.com/office/powerpoint/2010/main" val="112555710"/>
+      </p:ext>
+    </p:extLst>
+  </p:cSld>
+  <p:clrMapOvr>
+    <a:masterClrMapping/>
+  </p:clrMapOvr>
+</p:sld>
+</file>
+
+<file path=ppt/slides/slide7.xml><?xml version="1.0" encoding="utf-8"?>
+<p:sld xmlns:a="http://schemas.openxmlformats.org/drawingml/2006/main" xmlns:r="http://schemas.openxmlformats.org/officeDocument/2006/relationships" xmlns:p="http://schemas.openxmlformats.org/presentationml/2006/main">
+  <p:cSld>
+    <p:spTree>
+      <p:nvGrpSpPr>
+        <p:cNvPr id="1" name=""/>
+        <p:cNvGrpSpPr/>
+        <p:nvPr/>
+      </p:nvGrpSpPr>
+      <p:grpSpPr>
+        <a:xfrm>
+          <a:off x="0" y="0"/>
+          <a:ext cx="0" cy="0"/>
+          <a:chOff x="0" y="0"/>
+          <a:chExt cx="0" cy="0"/>
+        </a:xfrm>
+      </p:grpSpPr>
+      <p:sp>
+        <p:nvSpPr>
+          <p:cNvPr id="2" name="Content Placeholder 1">
+            <a:extLst>
+              <a:ext uri="{FF2B5EF4-FFF2-40B4-BE49-F238E27FC236}">
+                <a16:creationId xmlns:a16="http://schemas.microsoft.com/office/drawing/2014/main" id="{62F0C778-32F6-4750-AA9D-CF74A2AD5ADD}"/>
+              </a:ext>
+            </a:extLst>
+          </p:cNvPr>
+          <p:cNvSpPr>
+            <a:spLocks noGrp="1"/>
+          </p:cNvSpPr>
+          <p:nvPr>
+            <p:ph idx="1"/>
+          </p:nvPr>
+        </p:nvSpPr>
+        <p:spPr>
+          <a:xfrm>
+            <a:off x="313245" y="1038225"/>
+            <a:ext cx="11338560" cy="5067302"/>
+          </a:xfrm>
+        </p:spPr>
+        <p:txBody>
+          <a:bodyPr/>
+          <a:lstStyle/>
+          <a:p>
+            <a:r>
+              <a:rPr lang="en-US" altLang="zh-CN" dirty="0"/>
+              <a:t>Usage:</a:t>
+            </a:r>
+          </a:p>
+          <a:p>
+            <a:pPr lvl="1"/>
+            <a:r>
+              <a:rPr lang="en-US" altLang="zh-CN" dirty="0"/>
+              <a:t>Example: </a:t>
+            </a:r>
+            <a:r>
+              <a:rPr lang="en-US" altLang="zh-CN" sz="1600" dirty="0">
+                <a:latin typeface="Consolas" panose="020B0609020204030204" pitchFamily="49" charset="0"/>
+              </a:rPr>
+              <a:t>./</a:t>
+            </a:r>
+            <a:r>
+              <a:rPr lang="en-US" altLang="zh-CN" sz="1600" dirty="0" err="1">
+                <a:latin typeface="Consolas" panose="020B0609020204030204" pitchFamily="49" charset="0"/>
+              </a:rPr>
+              <a:t>TensileLite.out</a:t>
+            </a:r>
+            <a:r>
+              <a:rPr lang="en-US" altLang="zh-CN" sz="1600" dirty="0">
+                <a:latin typeface="Consolas" panose="020B0609020204030204" pitchFamily="49" charset="0"/>
+              </a:rPr>
+              <a:t> –m 1024 –n 1024 –k 1024 –t 0 –v 1 –l 100 –r 1 –s 2 –x 2 –y 2 –d 1</a:t>
+            </a:r>
+          </a:p>
+          <a:p>
+            <a:pPr lvl="1"/>
+            <a:endParaRPr lang="en-US" altLang="zh-CN" sz="1600" dirty="0">
+              <a:latin typeface="Consolas" panose="020B0609020204030204" pitchFamily="49" charset="0"/>
+            </a:endParaRPr>
+          </a:p>
+          <a:p>
+            <a:pPr lvl="1"/>
+            <a:r>
+              <a:rPr lang="en-US" altLang="zh-CN" dirty="0"/>
+              <a:t>-m: </a:t>
+            </a:r>
+            <a:r>
+              <a:rPr lang="en-US" altLang="zh-CN" dirty="0" err="1"/>
+              <a:t>gemm</a:t>
+            </a:r>
+            <a:r>
+              <a:rPr lang="en-US" altLang="zh-CN" dirty="0"/>
+              <a:t> size in M without padding, default is 1024</a:t>
+            </a:r>
+          </a:p>
+          <a:p>
+            <a:pPr lvl="1"/>
+            <a:r>
+              <a:rPr lang="en-US" altLang="zh-CN" dirty="0"/>
+              <a:t>-n: </a:t>
+            </a:r>
+            <a:r>
+              <a:rPr lang="en-US" altLang="zh-CN" dirty="0" err="1"/>
+              <a:t>gemm</a:t>
+            </a:r>
+            <a:r>
+              <a:rPr lang="en-US" altLang="zh-CN" dirty="0"/>
+              <a:t> size in N without padding, default is 1024</a:t>
+            </a:r>
+          </a:p>
+          <a:p>
+            <a:pPr lvl="1"/>
+            <a:r>
+              <a:rPr lang="en-US" altLang="zh-CN" dirty="0"/>
+              <a:t>-k: </a:t>
+            </a:r>
+            <a:r>
+              <a:rPr lang="en-US" altLang="zh-CN" dirty="0" err="1"/>
+              <a:t>gemm</a:t>
+            </a:r>
+            <a:r>
+              <a:rPr lang="en-US" altLang="zh-CN" dirty="0"/>
+              <a:t> size in K without padding, default is 1024</a:t>
+            </a:r>
+          </a:p>
+          <a:p>
+            <a:pPr lvl="1"/>
+            <a:r>
+              <a:rPr lang="en-US" altLang="zh-CN" dirty="0"/>
+              <a:t>-d: data type. 1=fp32, 2=fp16, 3=bf16. default is 1</a:t>
+            </a:r>
+          </a:p>
+          <a:p>
+            <a:pPr lvl="1"/>
+            <a:r>
+              <a:rPr lang="en-US" altLang="zh-CN" dirty="0"/>
+              <a:t>-v: if enable </a:t>
+            </a:r>
+            <a:r>
+              <a:rPr lang="en-US" altLang="zh-CN" dirty="0" err="1"/>
+              <a:t>cpu</a:t>
+            </a:r>
+            <a:r>
+              <a:rPr lang="en-US" altLang="zh-CN" dirty="0"/>
+              <a:t> verification. 1=enable, 0=disable. Default is 1</a:t>
+            </a:r>
+          </a:p>
+          <a:p>
+            <a:pPr lvl="1"/>
+            <a:r>
+              <a:rPr lang="en-US" altLang="zh-CN" dirty="0"/>
+              <a:t>-l: iteration times to measure kernel performance</a:t>
+            </a:r>
+          </a:p>
+          <a:p>
+            <a:pPr lvl="1"/>
+            <a:r>
+              <a:rPr lang="en-US" altLang="zh-CN" dirty="0"/>
+              <a:t>-t: enable tensile portable kernel name. 1=using tensile format, 0 = using local format</a:t>
+            </a:r>
+          </a:p>
+          <a:p>
+            <a:pPr lvl="1"/>
+            <a:endParaRPr lang="en-US" altLang="zh-CN" dirty="0"/>
+          </a:p>
+        </p:txBody>
+      </p:sp>
+      <p:sp>
+        <p:nvSpPr>
+          <p:cNvPr id="3" name="Title 2">
+            <a:extLst>
+              <a:ext uri="{FF2B5EF4-FFF2-40B4-BE49-F238E27FC236}">
+                <a16:creationId xmlns:a16="http://schemas.microsoft.com/office/drawing/2014/main" id="{CEDC0840-5118-4BFD-899F-D50C1A686498}"/>
+              </a:ext>
+            </a:extLst>
+          </p:cNvPr>
+          <p:cNvSpPr>
+            <a:spLocks noGrp="1"/>
+          </p:cNvSpPr>
+          <p:nvPr>
+            <p:ph type="title"/>
+          </p:nvPr>
+        </p:nvSpPr>
+        <p:spPr/>
+        <p:txBody>
+          <a:bodyPr/>
+          <a:lstStyle/>
+          <a:p>
+            <a:r>
+              <a:rPr lang="en-US" altLang="zh-CN" dirty="0"/>
+              <a:t>Auto generator </a:t>
+            </a:r>
+            <a:endParaRPr lang="en-US" dirty="0"/>
+          </a:p>
+        </p:txBody>
+      </p:sp>
+      <p:sp>
+        <p:nvSpPr>
+          <p:cNvPr id="4" name="Text Placeholder 3">
+            <a:extLst>
+              <a:ext uri="{FF2B5EF4-FFF2-40B4-BE49-F238E27FC236}">
+                <a16:creationId xmlns:a16="http://schemas.microsoft.com/office/drawing/2014/main" id="{23BC3E91-3C7D-4DD3-9DC0-25A44DC2381D}"/>
+              </a:ext>
+            </a:extLst>
+          </p:cNvPr>
+          <p:cNvSpPr>
+            <a:spLocks noGrp="1"/>
+          </p:cNvSpPr>
+          <p:nvPr>
+            <p:ph type="body" sz="quarter" idx="10"/>
+          </p:nvPr>
+        </p:nvSpPr>
+        <p:spPr/>
+        <p:txBody>
+          <a:bodyPr/>
+          <a:lstStyle/>
+          <a:p>
+            <a:endParaRPr lang="en-US" dirty="0"/>
+          </a:p>
+        </p:txBody>
+      </p:sp>
+    </p:spTree>
+    <p:extLst>
+      <p:ext uri="{BB962C8B-B14F-4D97-AF65-F5344CB8AC3E}">
+        <p14:creationId xmlns:p14="http://schemas.microsoft.com/office/powerpoint/2010/main" val="1351248671"/>
+      </p:ext>
+    </p:extLst>
+  </p:cSld>
+  <p:clrMapOvr>
+    <a:masterClrMapping/>
+  </p:clrMapOvr>
+</p:sld>
+</file>
+
+<file path=ppt/slides/slide8.xml><?xml version="1.0" encoding="utf-8"?>
+<p:sld xmlns:a="http://schemas.openxmlformats.org/drawingml/2006/main" xmlns:r="http://schemas.openxmlformats.org/officeDocument/2006/relationships" xmlns:p="http://schemas.openxmlformats.org/presentationml/2006/main">
+  <p:cSld>
+    <p:spTree>
+      <p:nvGrpSpPr>
+        <p:cNvPr id="1" name=""/>
+        <p:cNvGrpSpPr/>
+        <p:nvPr/>
+      </p:nvGrpSpPr>
+      <p:grpSpPr>
+        <a:xfrm>
+          <a:off x="0" y="0"/>
+          <a:ext cx="0" cy="0"/>
+          <a:chOff x="0" y="0"/>
+          <a:chExt cx="0" cy="0"/>
+        </a:xfrm>
+      </p:grpSpPr>
+      <p:sp>
+        <p:nvSpPr>
+          <p:cNvPr id="2" name="Content Placeholder 1">
+            <a:extLst>
+              <a:ext uri="{FF2B5EF4-FFF2-40B4-BE49-F238E27FC236}">
+                <a16:creationId xmlns:a16="http://schemas.microsoft.com/office/drawing/2014/main" id="{62F0C778-32F6-4750-AA9D-CF74A2AD5ADD}"/>
+              </a:ext>
+            </a:extLst>
+          </p:cNvPr>
+          <p:cNvSpPr>
+            <a:spLocks noGrp="1"/>
+          </p:cNvSpPr>
+          <p:nvPr>
+            <p:ph idx="1"/>
+          </p:nvPr>
+        </p:nvSpPr>
+        <p:spPr>
+          <a:xfrm>
+            <a:off x="313245" y="1038225"/>
+            <a:ext cx="11338560" cy="5067302"/>
+          </a:xfrm>
+        </p:spPr>
+        <p:txBody>
+          <a:bodyPr/>
+          <a:lstStyle/>
+          <a:p>
+            <a:r>
+              <a:rPr lang="en-US" altLang="zh-CN" dirty="0"/>
+              <a:t>Usage continue:</a:t>
+            </a:r>
+          </a:p>
+          <a:p>
+            <a:pPr lvl="1"/>
+            <a:r>
+              <a:rPr lang="en-US" altLang="zh-CN" dirty="0"/>
+              <a:t>Example: </a:t>
+            </a:r>
+            <a:r>
+              <a:rPr lang="en-US" altLang="zh-CN" sz="1600" dirty="0">
+                <a:latin typeface="Consolas" panose="020B0609020204030204" pitchFamily="49" charset="0"/>
+              </a:rPr>
+              <a:t>./</a:t>
+            </a:r>
+            <a:r>
+              <a:rPr lang="en-US" altLang="zh-CN" sz="1600" dirty="0" err="1">
+                <a:latin typeface="Consolas" panose="020B0609020204030204" pitchFamily="49" charset="0"/>
+              </a:rPr>
+              <a:t>TensileLite.out</a:t>
+            </a:r>
+            <a:r>
+              <a:rPr lang="en-US" altLang="zh-CN" sz="1600" dirty="0">
+                <a:latin typeface="Consolas" panose="020B0609020204030204" pitchFamily="49" charset="0"/>
+              </a:rPr>
+              <a:t> –m 1024 –n 1024 –k 1024 –t 0 –v 1 –l 100 –r 2 –s 2 –x 2 –y 2 –d 1</a:t>
+            </a:r>
+          </a:p>
+          <a:p>
+            <a:pPr lvl="1"/>
+            <a:endParaRPr lang="en-US" altLang="zh-CN" sz="1600" dirty="0">
+              <a:latin typeface="Consolas" panose="020B0609020204030204" pitchFamily="49" charset="0"/>
+            </a:endParaRPr>
+          </a:p>
+          <a:p>
+            <a:pPr lvl="1"/>
+            <a:r>
+              <a:rPr lang="en-US" altLang="zh-CN" dirty="0"/>
+              <a:t>-r: </a:t>
+            </a:r>
+            <a:r>
+              <a:rPr lang="en-US" altLang="zh-CN" dirty="0" err="1"/>
+              <a:t>mfma</a:t>
+            </a:r>
+            <a:r>
+              <a:rPr lang="en-US" altLang="zh-CN" dirty="0"/>
+              <a:t> tile per wave in M dim, default is 1</a:t>
+            </a:r>
+          </a:p>
+          <a:p>
+            <a:pPr lvl="1"/>
+            <a:r>
+              <a:rPr lang="en-US" altLang="zh-CN" dirty="0"/>
+              <a:t>-s: </a:t>
+            </a:r>
+            <a:r>
+              <a:rPr lang="en-US" altLang="zh-CN" dirty="0" err="1"/>
+              <a:t>mfma</a:t>
+            </a:r>
+            <a:r>
+              <a:rPr lang="en-US" altLang="zh-CN" dirty="0"/>
+              <a:t> tile per wave in N dim, default is 1</a:t>
+            </a:r>
+          </a:p>
+          <a:p>
+            <a:pPr lvl="1"/>
+            <a:r>
+              <a:rPr lang="en-US" altLang="zh-CN" dirty="0"/>
+              <a:t>-x: wave tile per group in M dim, default is 1</a:t>
+            </a:r>
+          </a:p>
+          <a:p>
+            <a:pPr lvl="1"/>
+            <a:r>
+              <a:rPr lang="en-US" altLang="zh-CN" dirty="0"/>
+              <a:t>-y: wave tile per group in N dim, default is 1</a:t>
+            </a:r>
+          </a:p>
+          <a:p>
+            <a:pPr lvl="1"/>
+            <a:r>
+              <a:rPr lang="en-US" altLang="zh-CN" dirty="0"/>
+              <a:t>-u: </a:t>
+            </a:r>
+            <a:r>
+              <a:rPr lang="en-US" altLang="zh-CN" dirty="0" err="1"/>
+              <a:t>depthU</a:t>
+            </a:r>
+            <a:r>
+              <a:rPr lang="en-US" altLang="zh-CN" dirty="0"/>
+              <a:t> in K dim, default is 16</a:t>
+            </a:r>
+          </a:p>
+        </p:txBody>
+      </p:sp>
+      <p:sp>
+        <p:nvSpPr>
+          <p:cNvPr id="3" name="Title 2">
+            <a:extLst>
+              <a:ext uri="{FF2B5EF4-FFF2-40B4-BE49-F238E27FC236}">
+                <a16:creationId xmlns:a16="http://schemas.microsoft.com/office/drawing/2014/main" id="{CEDC0840-5118-4BFD-899F-D50C1A686498}"/>
+              </a:ext>
+            </a:extLst>
+          </p:cNvPr>
+          <p:cNvSpPr>
+            <a:spLocks noGrp="1"/>
+          </p:cNvSpPr>
+          <p:nvPr>
+            <p:ph type="title"/>
+          </p:nvPr>
+        </p:nvSpPr>
+        <p:spPr/>
+        <p:txBody>
+          <a:bodyPr/>
+          <a:lstStyle/>
+          <a:p>
+            <a:r>
+              <a:rPr lang="en-US" altLang="zh-CN" dirty="0"/>
+              <a:t>Auto generator </a:t>
+            </a:r>
+            <a:endParaRPr lang="en-US" dirty="0"/>
+          </a:p>
+        </p:txBody>
+      </p:sp>
+      <p:sp>
+        <p:nvSpPr>
+          <p:cNvPr id="4" name="Text Placeholder 3">
+            <a:extLst>
+              <a:ext uri="{FF2B5EF4-FFF2-40B4-BE49-F238E27FC236}">
+                <a16:creationId xmlns:a16="http://schemas.microsoft.com/office/drawing/2014/main" id="{23BC3E91-3C7D-4DD3-9DC0-25A44DC2381D}"/>
+              </a:ext>
+            </a:extLst>
+          </p:cNvPr>
+          <p:cNvSpPr>
+            <a:spLocks noGrp="1"/>
+          </p:cNvSpPr>
+          <p:nvPr>
+            <p:ph type="body" sz="quarter" idx="10"/>
+          </p:nvPr>
+        </p:nvSpPr>
+        <p:spPr/>
+        <p:txBody>
+          <a:bodyPr/>
+          <a:lstStyle/>
+          <a:p>
+            <a:endParaRPr lang="en-US" dirty="0"/>
+          </a:p>
+        </p:txBody>
+      </p:sp>
+      <p:pic>
+        <p:nvPicPr>
+          <p:cNvPr id="6" name="Picture 5" descr="A screenshot of a cell phone&#10;&#10;Description automatically generated">
+            <a:extLst>
+              <a:ext uri="{FF2B5EF4-FFF2-40B4-BE49-F238E27FC236}">
+                <a16:creationId xmlns:a16="http://schemas.microsoft.com/office/drawing/2014/main" id="{D433E55E-C91D-4B18-A9FC-4C564B980403}"/>
+              </a:ext>
+            </a:extLst>
+          </p:cNvPr>
+          <p:cNvPicPr>
+            <a:picLocks noChangeAspect="1"/>
+          </p:cNvPicPr>
+          <p:nvPr/>
+        </p:nvPicPr>
+        <p:blipFill>
+          <a:blip r:embed="rId2">
+            <a:extLst>
+              <a:ext uri="{28A0092B-C50C-407E-A947-70E740481C1C}">
+                <a14:useLocalDpi xmlns:a14="http://schemas.microsoft.com/office/drawing/2010/main" val="0"/>
+              </a:ext>
+            </a:extLst>
+          </a:blip>
+          <a:stretch>
+            <a:fillRect/>
+          </a:stretch>
+        </p:blipFill>
+        <p:spPr>
+          <a:xfrm>
+            <a:off x="6858001" y="2065141"/>
+            <a:ext cx="5017580" cy="4514729"/>
+          </a:xfrm>
+          <a:prstGeom prst="rect">
+            <a:avLst/>
+          </a:prstGeom>
+        </p:spPr>
+      </p:pic>
+    </p:spTree>
+    <p:extLst>
+      <p:ext uri="{BB962C8B-B14F-4D97-AF65-F5344CB8AC3E}">
+        <p14:creationId xmlns:p14="http://schemas.microsoft.com/office/powerpoint/2010/main" val="2115074603"/>
+      </p:ext>
+    </p:extLst>
+  </p:cSld>
+  <p:clrMapOvr>
+    <a:masterClrMapping/>
+  </p:clrMapOvr>
+</p:sld>
+</file>
+
+<file path=ppt/slides/slide9.xml><?xml version="1.0" encoding="utf-8"?>
+<p:sld xmlns:a="http://schemas.openxmlformats.org/drawingml/2006/main" xmlns:r="http://schemas.openxmlformats.org/officeDocument/2006/relationships" xmlns:p="http://schemas.openxmlformats.org/presentationml/2006/main">
+  <p:cSld>
+    <p:spTree>
+      <p:nvGrpSpPr>
+        <p:cNvPr id="1" name=""/>
+        <p:cNvGrpSpPr/>
+        <p:nvPr/>
+      </p:nvGrpSpPr>
+      <p:grpSpPr>
+        <a:xfrm>
+          <a:off x="0" y="0"/>
+          <a:ext cx="0" cy="0"/>
+          <a:chOff x="0" y="0"/>
+          <a:chExt cx="0" cy="0"/>
+        </a:xfrm>
+      </p:grpSpPr>
+      <p:sp>
+        <p:nvSpPr>
+          <p:cNvPr id="2" name="Content Placeholder 1">
+            <a:extLst>
+              <a:ext uri="{FF2B5EF4-FFF2-40B4-BE49-F238E27FC236}">
+                <a16:creationId xmlns:a16="http://schemas.microsoft.com/office/drawing/2014/main" id="{62F0C778-32F6-4750-AA9D-CF74A2AD5ADD}"/>
+              </a:ext>
+            </a:extLst>
+          </p:cNvPr>
+          <p:cNvSpPr>
+            <a:spLocks noGrp="1"/>
+          </p:cNvSpPr>
+          <p:nvPr>
+            <p:ph idx="1"/>
+          </p:nvPr>
+        </p:nvSpPr>
+        <p:spPr>
+          <a:xfrm>
+            <a:off x="313245" y="1038225"/>
+            <a:ext cx="11338560" cy="5067302"/>
+          </a:xfrm>
+        </p:spPr>
+        <p:txBody>
+          <a:bodyPr/>
+          <a:lstStyle/>
+          <a:p>
+            <a:r>
+              <a:rPr lang="en-US" altLang="zh-CN" dirty="0"/>
+              <a:t>Performance – 1K/2K/4K/8K:</a:t>
+            </a:r>
+          </a:p>
+        </p:txBody>
+      </p:sp>
+      <p:sp>
+        <p:nvSpPr>
+          <p:cNvPr id="3" name="Title 2">
+            <a:extLst>
+              <a:ext uri="{FF2B5EF4-FFF2-40B4-BE49-F238E27FC236}">
+                <a16:creationId xmlns:a16="http://schemas.microsoft.com/office/drawing/2014/main" id="{CEDC0840-5118-4BFD-899F-D50C1A686498}"/>
+              </a:ext>
+            </a:extLst>
+          </p:cNvPr>
+          <p:cNvSpPr>
+            <a:spLocks noGrp="1"/>
+          </p:cNvSpPr>
+          <p:nvPr>
+            <p:ph type="title"/>
+          </p:nvPr>
+        </p:nvSpPr>
+        <p:spPr/>
+        <p:txBody>
+          <a:bodyPr/>
+          <a:lstStyle/>
+          <a:p>
+            <a:r>
+              <a:rPr lang="en-US" altLang="zh-CN" dirty="0"/>
+              <a:t>Auto generator </a:t>
+            </a:r>
+            <a:endParaRPr lang="en-US" dirty="0"/>
+          </a:p>
+        </p:txBody>
+      </p:sp>
+      <p:sp>
+        <p:nvSpPr>
+          <p:cNvPr id="4" name="Text Placeholder 3">
+            <a:extLst>
+              <a:ext uri="{FF2B5EF4-FFF2-40B4-BE49-F238E27FC236}">
+                <a16:creationId xmlns:a16="http://schemas.microsoft.com/office/drawing/2014/main" id="{23BC3E91-3C7D-4DD3-9DC0-25A44DC2381D}"/>
+              </a:ext>
+            </a:extLst>
+          </p:cNvPr>
+          <p:cNvSpPr>
+            <a:spLocks noGrp="1"/>
+          </p:cNvSpPr>
+          <p:nvPr>
+            <p:ph type="body" sz="quarter" idx="10"/>
+          </p:nvPr>
+        </p:nvSpPr>
+        <p:spPr/>
+        <p:txBody>
+          <a:bodyPr/>
+          <a:lstStyle/>
+          <a:p>
+            <a:endParaRPr lang="en-US" dirty="0"/>
+          </a:p>
+        </p:txBody>
+      </p:sp>
+      <p:pic>
+        <p:nvPicPr>
+          <p:cNvPr id="6" name="Picture 5" descr="A picture containing cabinet, clock&#10;&#10;Description automatically generated">
+            <a:extLst>
+              <a:ext uri="{FF2B5EF4-FFF2-40B4-BE49-F238E27FC236}">
+                <a16:creationId xmlns:a16="http://schemas.microsoft.com/office/drawing/2014/main" id="{DFB92E9B-926D-4C75-BE64-5432A84AF672}"/>
+              </a:ext>
+            </a:extLst>
+          </p:cNvPr>
+          <p:cNvPicPr>
+            <a:picLocks noChangeAspect="1"/>
+          </p:cNvPicPr>
+          <p:nvPr/>
+        </p:nvPicPr>
+        <p:blipFill>
+          <a:blip r:embed="rId2">
+            <a:extLst>
+              <a:ext uri="{28A0092B-C50C-407E-A947-70E740481C1C}">
+                <a14:useLocalDpi xmlns:a14="http://schemas.microsoft.com/office/drawing/2010/main" val="0"/>
+              </a:ext>
+            </a:extLst>
+          </a:blip>
+          <a:stretch>
+            <a:fillRect/>
+          </a:stretch>
+        </p:blipFill>
+        <p:spPr>
+          <a:xfrm>
+            <a:off x="895641" y="1667933"/>
+            <a:ext cx="9940344" cy="3234267"/>
+          </a:xfrm>
+          <a:prstGeom prst="rect">
+            <a:avLst/>
+          </a:prstGeom>
+        </p:spPr>
+      </p:pic>
+    </p:spTree>
+    <p:extLst>
+      <p:ext uri="{BB962C8B-B14F-4D97-AF65-F5344CB8AC3E}">
+        <p14:creationId xmlns:p14="http://schemas.microsoft.com/office/powerpoint/2010/main" val="3187229991"/>
       </p:ext>
     </p:extLst>
   </p:cSld>
@@ -5299,15 +6601,6 @@
 </file>
 
 <file path=customXml/item1.xml><?xml version="1.0" encoding="utf-8"?>
-<?mso-contentType ?>
-<FormTemplates xmlns="http://schemas.microsoft.com/sharepoint/v3/contenttype/forms">
-  <Display>DocumentLibraryForm</Display>
-  <Edit>DocumentLibraryForm</Edit>
-  <New>DocumentLibraryForm</New>
-</FormTemplates>
-</file>
-
-<file path=customXml/item2.xml><?xml version="1.0" encoding="utf-8"?>
 <ct:contentTypeSchema xmlns:ct="http://schemas.microsoft.com/office/2006/metadata/contentType" xmlns:ma="http://schemas.microsoft.com/office/2006/metadata/properties/metaAttributes" ct:_="" ma:_="" ma:contentTypeName="Document" ma:contentTypeID="0x010100B040F28C9190714F9051F1661A72B344" ma:contentTypeVersion="0" ma:contentTypeDescription="Create a new document." ma:contentTypeScope="" ma:versionID="b8b95d69f10381dae1e3fc8aa097d9b2">
   <xsd:schema xmlns:xsd="http://www.w3.org/2001/XMLSchema" xmlns:xs="http://www.w3.org/2001/XMLSchema" xmlns:p="http://schemas.microsoft.com/office/2006/metadata/properties" targetNamespace="http://schemas.microsoft.com/office/2006/metadata/properties" ma:root="true" ma:fieldsID="1b05d82d297216baf5b26c55225140df">
     <xsd:element name="properties">
@@ -5421,15 +6714,16 @@
 </ct:contentTypeSchema>
 </file>
 
-<file path=customXml/itemProps1.xml><?xml version="1.0" encoding="utf-8"?>
-<ds:datastoreItem xmlns:ds="http://schemas.openxmlformats.org/officeDocument/2006/customXml" ds:itemID="{46C7C7BA-398C-443C-9325-A8C61CE3C0A0}">
-  <ds:schemaRefs>
-    <ds:schemaRef ds:uri="http://schemas.microsoft.com/sharepoint/v3/contenttype/forms"/>
-  </ds:schemaRefs>
-</ds:datastoreItem>
+<file path=customXml/item2.xml><?xml version="1.0" encoding="utf-8"?>
+<?mso-contentType ?>
+<FormTemplates xmlns="http://schemas.microsoft.com/sharepoint/v3/contenttype/forms">
+  <Display>DocumentLibraryForm</Display>
+  <Edit>DocumentLibraryForm</Edit>
+  <New>DocumentLibraryForm</New>
+</FormTemplates>
 </file>
 
-<file path=customXml/itemProps2.xml><?xml version="1.0" encoding="utf-8"?>
+<file path=customXml/itemProps1.xml><?xml version="1.0" encoding="utf-8"?>
 <ds:datastoreItem xmlns:ds="http://schemas.openxmlformats.org/officeDocument/2006/customXml" ds:itemID="{CB9B9DAE-0203-490A-8CF8-6A331C5A0B02}">
   <ds:schemaRefs>
     <ds:schemaRef ds:uri="http://schemas.microsoft.com/office/2006/metadata/contentType"/>
@@ -5443,4 +6737,12 @@
     <ds:schemaRef ds:uri="http://schemas.microsoft.com/office/infopath/2007/PartnerControls"/>
   </ds:schemaRefs>
 </ds:datastoreItem>
+</file>
+
+<file path=customXml/itemProps2.xml><?xml version="1.0" encoding="utf-8"?>
+<ds:datastoreItem xmlns:ds="http://schemas.openxmlformats.org/officeDocument/2006/customXml" ds:itemID="{46C7C7BA-398C-443C-9325-A8C61CE3C0A0}">
+  <ds:schemaRefs>
+    <ds:schemaRef ds:uri="http://schemas.microsoft.com/sharepoint/v3/contenttype/forms"/>
+  </ds:schemaRefs>
+</ds:datastoreItem>
 </file>
</xml_diff>